<commit_message>
Updates to M6 slides and code.
</commit_message>
<xml_diff>
--- a/M6_Monocle_Pseudotime/M6_Monocle_Timeseries.pptx
+++ b/M6_Monocle_Pseudotime/M6_Monocle_Timeseries.pptx
@@ -6413,36 +6413,6 @@
           </a:prstGeom>
         </p:spPr>
       </p:pic>
-      <p:pic>
-        <p:nvPicPr>
-          <p:cNvPr id="61" name="Picture 60">
-            <a:extLst>
-              <a:ext uri="{FF2B5EF4-FFF2-40B4-BE49-F238E27FC236}">
-                <a16:creationId xmlns:a16="http://schemas.microsoft.com/office/drawing/2014/main" id="{ED5A786C-871A-D8F0-F5CE-996BAA7B5369}"/>
-              </a:ext>
-            </a:extLst>
-          </p:cNvPr>
-          <p:cNvPicPr>
-            <a:picLocks noChangeAspect="1"/>
-          </p:cNvPicPr>
-          <p:nvPr/>
-        </p:nvPicPr>
-        <p:blipFill>
-          <a:blip r:embed="rId3"/>
-          <a:stretch>
-            <a:fillRect/>
-          </a:stretch>
-        </p:blipFill>
-        <p:spPr>
-          <a:xfrm>
-            <a:off x="4132517" y="890234"/>
-            <a:ext cx="5849166" cy="1009791"/>
-          </a:xfrm>
-          <a:prstGeom prst="rect">
-            <a:avLst/>
-          </a:prstGeom>
-        </p:spPr>
-      </p:pic>
       <p:sp>
         <p:nvSpPr>
           <p:cNvPr id="3" name="TextBox 2">
@@ -6621,6 +6591,36 @@
           </a:p>
         </p:txBody>
       </p:sp>
+      <p:pic>
+        <p:nvPicPr>
+          <p:cNvPr id="9" name="Picture 8">
+            <a:extLst>
+              <a:ext uri="{FF2B5EF4-FFF2-40B4-BE49-F238E27FC236}">
+                <a16:creationId xmlns:a16="http://schemas.microsoft.com/office/drawing/2014/main" id="{BD7CD4FF-E68F-EDCD-2E75-062BD42D2E5C}"/>
+              </a:ext>
+            </a:extLst>
+          </p:cNvPr>
+          <p:cNvPicPr>
+            <a:picLocks noChangeAspect="1"/>
+          </p:cNvPicPr>
+          <p:nvPr/>
+        </p:nvPicPr>
+        <p:blipFill>
+          <a:blip r:embed="rId3"/>
+          <a:stretch>
+            <a:fillRect/>
+          </a:stretch>
+        </p:blipFill>
+        <p:spPr>
+          <a:xfrm>
+            <a:off x="4230983" y="930296"/>
+            <a:ext cx="5668166" cy="914528"/>
+          </a:xfrm>
+          <a:prstGeom prst="rect">
+            <a:avLst/>
+          </a:prstGeom>
+        </p:spPr>
+      </p:pic>
     </p:spTree>
     <p:extLst>
       <p:ext uri="{BB962C8B-B14F-4D97-AF65-F5344CB8AC3E}">
@@ -6687,10 +6687,10 @@
       </p:sp>
       <p:pic>
         <p:nvPicPr>
-          <p:cNvPr id="62" name="Picture 61">
-            <a:extLst>
-              <a:ext uri="{FF2B5EF4-FFF2-40B4-BE49-F238E27FC236}">
-                <a16:creationId xmlns:a16="http://schemas.microsoft.com/office/drawing/2014/main" id="{AD8498BB-7E6E-1AC8-C83B-713223D4BCDD}"/>
+          <p:cNvPr id="66" name="Picture 65">
+            <a:extLst>
+              <a:ext uri="{FF2B5EF4-FFF2-40B4-BE49-F238E27FC236}">
+                <a16:creationId xmlns:a16="http://schemas.microsoft.com/office/drawing/2014/main" id="{3531DC74-23CC-3935-9FFE-169DADC20FB8}"/>
               </a:ext>
             </a:extLst>
           </p:cNvPr>
@@ -6707,37 +6707,7 @@
         </p:blipFill>
         <p:spPr>
           <a:xfrm>
-            <a:off x="3392611" y="730824"/>
-            <a:ext cx="6096851" cy="2324424"/>
-          </a:xfrm>
-          <a:prstGeom prst="rect">
-            <a:avLst/>
-          </a:prstGeom>
-        </p:spPr>
-      </p:pic>
-      <p:pic>
-        <p:nvPicPr>
-          <p:cNvPr id="66" name="Picture 65">
-            <a:extLst>
-              <a:ext uri="{FF2B5EF4-FFF2-40B4-BE49-F238E27FC236}">
-                <a16:creationId xmlns:a16="http://schemas.microsoft.com/office/drawing/2014/main" id="{3531DC74-23CC-3935-9FFE-169DADC20FB8}"/>
-              </a:ext>
-            </a:extLst>
-          </p:cNvPr>
-          <p:cNvPicPr>
-            <a:picLocks noChangeAspect="1"/>
-          </p:cNvPicPr>
-          <p:nvPr/>
-        </p:nvPicPr>
-        <p:blipFill>
-          <a:blip r:embed="rId3"/>
-          <a:stretch>
-            <a:fillRect/>
-          </a:stretch>
-        </p:blipFill>
-        <p:spPr>
-          <a:xfrm>
-            <a:off x="3526899" y="3251200"/>
+            <a:off x="3538699" y="3251200"/>
             <a:ext cx="5509176" cy="3503836"/>
           </a:xfrm>
           <a:prstGeom prst="rect">
@@ -6979,10 +6949,10 @@
       </p:sp>
       <p:pic>
         <p:nvPicPr>
-          <p:cNvPr id="130" name="Picture 129">
-            <a:extLst>
-              <a:ext uri="{FF2B5EF4-FFF2-40B4-BE49-F238E27FC236}">
-                <a16:creationId xmlns:a16="http://schemas.microsoft.com/office/drawing/2014/main" id="{61E533EB-19D5-386C-7ECA-C711F3788EDA}"/>
+          <p:cNvPr id="8" name="Picture 7">
+            <a:extLst>
+              <a:ext uri="{FF2B5EF4-FFF2-40B4-BE49-F238E27FC236}">
+                <a16:creationId xmlns:a16="http://schemas.microsoft.com/office/drawing/2014/main" id="{130952E8-C5C8-63AF-89D6-5ACB66841694}"/>
               </a:ext>
             </a:extLst>
           </p:cNvPr>
@@ -6991,16 +6961,44 @@
           </p:cNvPicPr>
           <p:nvPr/>
         </p:nvPicPr>
-        <p:blipFill>
-          <a:blip r:embed="rId4"/>
-          <a:stretch>
-            <a:fillRect/>
-          </a:stretch>
+        <p:blipFill rotWithShape="1">
+          <a:blip r:embed="rId3"/>
+          <a:srcRect b="23384"/>
+          <a:stretch/>
         </p:blipFill>
         <p:spPr>
           <a:xfrm>
-            <a:off x="7277218" y="2841568"/>
-            <a:ext cx="4734586" cy="819264"/>
+            <a:off x="3702126" y="762345"/>
+            <a:ext cx="5182323" cy="2488855"/>
+          </a:xfrm>
+          <a:prstGeom prst="rect">
+            <a:avLst/>
+          </a:prstGeom>
+        </p:spPr>
+      </p:pic>
+      <p:pic>
+        <p:nvPicPr>
+          <p:cNvPr id="9" name="Picture 8">
+            <a:extLst>
+              <a:ext uri="{FF2B5EF4-FFF2-40B4-BE49-F238E27FC236}">
+                <a16:creationId xmlns:a16="http://schemas.microsoft.com/office/drawing/2014/main" id="{406DE658-E38B-B1DA-84CF-9BFDE43F5FBE}"/>
+              </a:ext>
+            </a:extLst>
+          </p:cNvPr>
+          <p:cNvPicPr>
+            <a:picLocks noChangeAspect="1"/>
+          </p:cNvPicPr>
+          <p:nvPr/>
+        </p:nvPicPr>
+        <p:blipFill rotWithShape="1">
+          <a:blip r:embed="rId3"/>
+          <a:srcRect t="75617" r="8001"/>
+          <a:stretch/>
+        </p:blipFill>
+        <p:spPr>
+          <a:xfrm>
+            <a:off x="7265809" y="2814742"/>
+            <a:ext cx="4767696" cy="792059"/>
           </a:xfrm>
           <a:prstGeom prst="rect">
             <a:avLst/>

</xml_diff>